<commit_message>
Update session 32 documents and php slides.
</commit_message>
<xml_diff>
--- a/CPSC-24700/Presentations/session-32.pptx
+++ b/CPSC-24700/Presentations/session-32.pptx
@@ -5,15 +5,16 @@
     <p:sldMasterId id="2147483648" r:id="rId1"/>
   </p:sldMasterIdLst>
   <p:notesMasterIdLst>
-    <p:notesMasterId r:id="rId8"/>
+    <p:notesMasterId r:id="rId9"/>
   </p:notesMasterIdLst>
   <p:sldIdLst>
     <p:sldId id="257" r:id="rId2"/>
     <p:sldId id="291" r:id="rId3"/>
     <p:sldId id="300" r:id="rId4"/>
-    <p:sldId id="301" r:id="rId5"/>
-    <p:sldId id="299" r:id="rId6"/>
-    <p:sldId id="263" r:id="rId7"/>
+    <p:sldId id="302" r:id="rId5"/>
+    <p:sldId id="301" r:id="rId6"/>
+    <p:sldId id="299" r:id="rId7"/>
+    <p:sldId id="263" r:id="rId8"/>
   </p:sldIdLst>
   <p:sldSz cx="12192000" cy="6858000"/>
   <p:notesSz cx="7315200" cy="9601200"/>
@@ -118,6 +119,10 @@
     </p:ext>
   </p:extLst>
 </p:presentation>
+</file>
+
+<file path=ppt/revisionInfo.xml><?xml version="1.0" encoding="utf-8"?>
+<p1510:revInfo xmlns:a="http://schemas.openxmlformats.org/drawingml/2006/main" xmlns:r="http://schemas.openxmlformats.org/officeDocument/2006/relationships" xmlns:p1510="http://schemas.microsoft.com/office/powerpoint/2015/10/main"/>
 </file>
 
 <file path=ppt/notesMasters/notesMaster1.xml><?xml version="1.0" encoding="utf-8"?>
@@ -683,7 +688,7 @@
           <a:p>
             <a:r>
               <a:rPr lang="en-US" sz="1000" dirty="0"/>
-              <a:t>Slide are available. </a:t>
+              <a:t>Hand outs. </a:t>
             </a:r>
           </a:p>
         </p:txBody>
@@ -768,7 +773,10 @@
           <a:bodyPr/>
           <a:lstStyle/>
           <a:p>
-            <a:endParaRPr lang="en-US" sz="1000" dirty="0"/>
+            <a:r>
+              <a:rPr lang="en-US" sz="1000" dirty="0"/>
+              <a:t>Slide are available. </a:t>
+            </a:r>
           </a:p>
         </p:txBody>
       </p:sp>
@@ -787,18 +795,18 @@
           <a:bodyPr/>
           <a:lstStyle/>
           <a:p>
-            <a:fld id="{23B99BB9-C7F6-43B3-A122-46088ABB36FB}" type="slidenum">
+            <a:fld id="{5394DE12-7B9B-46AA-AC19-C30A49928B9B}" type="slidenum">
               <a:rPr lang="en-US" smtClean="0"/>
               <a:t>4</a:t>
             </a:fld>
-            <a:endParaRPr lang="en-US"/>
+            <a:endParaRPr lang="en-US" dirty="0"/>
           </a:p>
         </p:txBody>
       </p:sp>
     </p:spTree>
     <p:extLst>
       <p:ext uri="{BB962C8B-B14F-4D97-AF65-F5344CB8AC3E}">
-        <p14:creationId xmlns:p14="http://schemas.microsoft.com/office/powerpoint/2010/main" val="1809836636"/>
+        <p14:creationId xmlns:p14="http://schemas.microsoft.com/office/powerpoint/2010/main" val="2943197788"/>
       </p:ext>
     </p:extLst>
   </p:cSld>
@@ -852,7 +860,7 @@
           <a:bodyPr/>
           <a:lstStyle/>
           <a:p>
-            <a:endParaRPr lang="en-US" dirty="0"/>
+            <a:endParaRPr lang="en-US" sz="1000" dirty="0"/>
           </a:p>
         </p:txBody>
       </p:sp>
@@ -871,18 +879,18 @@
           <a:bodyPr/>
           <a:lstStyle/>
           <a:p>
-            <a:fld id="{5394DE12-7B9B-46AA-AC19-C30A49928B9B}" type="slidenum">
+            <a:fld id="{23B99BB9-C7F6-43B3-A122-46088ABB36FB}" type="slidenum">
               <a:rPr lang="en-US" smtClean="0"/>
               <a:t>5</a:t>
             </a:fld>
-            <a:endParaRPr lang="en-US" dirty="0"/>
+            <a:endParaRPr lang="en-US"/>
           </a:p>
         </p:txBody>
       </p:sp>
     </p:spTree>
     <p:extLst>
       <p:ext uri="{BB962C8B-B14F-4D97-AF65-F5344CB8AC3E}">
-        <p14:creationId xmlns:p14="http://schemas.microsoft.com/office/powerpoint/2010/main" val="2032946705"/>
+        <p14:creationId xmlns:p14="http://schemas.microsoft.com/office/powerpoint/2010/main" val="1809836636"/>
       </p:ext>
     </p:extLst>
   </p:cSld>
@@ -958,6 +966,90 @@
             <a:fld id="{5394DE12-7B9B-46AA-AC19-C30A49928B9B}" type="slidenum">
               <a:rPr lang="en-US" smtClean="0"/>
               <a:t>6</a:t>
+            </a:fld>
+            <a:endParaRPr lang="en-US" dirty="0"/>
+          </a:p>
+        </p:txBody>
+      </p:sp>
+    </p:spTree>
+    <p:extLst>
+      <p:ext uri="{BB962C8B-B14F-4D97-AF65-F5344CB8AC3E}">
+        <p14:creationId xmlns:p14="http://schemas.microsoft.com/office/powerpoint/2010/main" val="2032946705"/>
+      </p:ext>
+    </p:extLst>
+  </p:cSld>
+  <p:clrMapOvr>
+    <a:masterClrMapping/>
+  </p:clrMapOvr>
+</p:notes>
+</file>
+
+<file path=ppt/notesSlides/notesSlide7.xml><?xml version="1.0" encoding="utf-8"?>
+<p:notes xmlns:a="http://schemas.openxmlformats.org/drawingml/2006/main" xmlns:r="http://schemas.openxmlformats.org/officeDocument/2006/relationships" xmlns:p="http://schemas.openxmlformats.org/presentationml/2006/main">
+  <p:cSld>
+    <p:spTree>
+      <p:nvGrpSpPr>
+        <p:cNvPr id="1" name=""/>
+        <p:cNvGrpSpPr/>
+        <p:nvPr/>
+      </p:nvGrpSpPr>
+      <p:grpSpPr>
+        <a:xfrm>
+          <a:off x="0" y="0"/>
+          <a:ext cx="0" cy="0"/>
+          <a:chOff x="0" y="0"/>
+          <a:chExt cx="0" cy="0"/>
+        </a:xfrm>
+      </p:grpSpPr>
+      <p:sp>
+        <p:nvSpPr>
+          <p:cNvPr id="2" name="Slide Image Placeholder 1"/>
+          <p:cNvSpPr>
+            <a:spLocks noGrp="1" noRot="1" noChangeAspect="1"/>
+          </p:cNvSpPr>
+          <p:nvPr>
+            <p:ph type="sldImg"/>
+          </p:nvPr>
+        </p:nvSpPr>
+        <p:spPr/>
+      </p:sp>
+      <p:sp>
+        <p:nvSpPr>
+          <p:cNvPr id="3" name="Notes Placeholder 2"/>
+          <p:cNvSpPr>
+            <a:spLocks noGrp="1"/>
+          </p:cNvSpPr>
+          <p:nvPr>
+            <p:ph type="body" idx="1"/>
+          </p:nvPr>
+        </p:nvSpPr>
+        <p:spPr/>
+        <p:txBody>
+          <a:bodyPr/>
+          <a:lstStyle/>
+          <a:p>
+            <a:endParaRPr lang="en-US" dirty="0"/>
+          </a:p>
+        </p:txBody>
+      </p:sp>
+      <p:sp>
+        <p:nvSpPr>
+          <p:cNvPr id="4" name="Slide Number Placeholder 3"/>
+          <p:cNvSpPr>
+            <a:spLocks noGrp="1"/>
+          </p:cNvSpPr>
+          <p:nvPr>
+            <p:ph type="sldNum" sz="quarter" idx="10"/>
+          </p:nvPr>
+        </p:nvSpPr>
+        <p:spPr/>
+        <p:txBody>
+          <a:bodyPr/>
+          <a:lstStyle/>
+          <a:p>
+            <a:fld id="{5394DE12-7B9B-46AA-AC19-C30A49928B9B}" type="slidenum">
+              <a:rPr lang="en-US" smtClean="0"/>
+              <a:t>7</a:t>
             </a:fld>
             <a:endParaRPr lang="en-US" dirty="0"/>
           </a:p>
@@ -4258,7 +4350,7 @@
         <p:spPr/>
         <p:txBody>
           <a:bodyPr>
-            <a:normAutofit/>
+            <a:normAutofit lnSpcReduction="10000"/>
           </a:bodyPr>
           <a:lstStyle/>
           <a:p>
@@ -4277,7 +4369,7 @@
             </a:pPr>
             <a:r>
               <a:rPr lang="en-US" sz="2000" dirty="0"/>
-              <a:t>Friendly Conversation &amp; Good Natured Banter… Final project direction and remaining presentations</a:t>
+              <a:t>Friendly Conversation &amp; Good Natured Banter</a:t>
             </a:r>
           </a:p>
           <a:p>
@@ -4287,7 +4379,7 @@
             </a:pPr>
             <a:r>
               <a:rPr lang="en-US" sz="2000" dirty="0"/>
-              <a:t>Contact Manager Demos on Wednesday… Chris &amp; Danny? Others?</a:t>
+              <a:t>Quick Review of Assignments From Last Class</a:t>
             </a:r>
           </a:p>
           <a:p>
@@ -4297,7 +4389,7 @@
             </a:pPr>
             <a:r>
               <a:rPr lang="en-US" sz="2000" dirty="0"/>
-              <a:t>Quick Review of Assignments From Last Class</a:t>
+              <a:t>Project 5 </a:t>
             </a:r>
           </a:p>
           <a:p>
@@ -4307,7 +4399,7 @@
             </a:pPr>
             <a:r>
               <a:rPr lang="en-US" sz="2000" dirty="0"/>
-              <a:t>PHP</a:t>
+              <a:t>Contact Manager Demos on Wednesday… Chris &amp; Danny? Others?</a:t>
             </a:r>
           </a:p>
           <a:p>
@@ -4317,7 +4409,7 @@
             </a:pPr>
             <a:r>
               <a:rPr lang="en-US" sz="2000" dirty="0"/>
-              <a:t>Today’s Assignment</a:t>
+              <a:t>PHP</a:t>
             </a:r>
           </a:p>
           <a:p>
@@ -4327,8 +4419,23 @@
             </a:pPr>
             <a:r>
               <a:rPr lang="en-US" sz="2000" dirty="0"/>
-              <a:t>Contact Manager Lite plus PHP Lab</a:t>
-            </a:r>
+              <a:t>Today’s Assignment</a:t>
+            </a:r>
+          </a:p>
+          <a:p>
+            <a:pPr marL="457200" indent="-457200">
+              <a:buFont typeface="+mj-lt"/>
+              <a:buAutoNum type="arabicPeriod"/>
+            </a:pPr>
+            <a:r>
+              <a:rPr lang="en-US" sz="2000" dirty="0"/>
+              <a:t>Contact </a:t>
+            </a:r>
+            <a:r>
+              <a:rPr lang="en-US" sz="2000"/>
+              <a:t>Manager Final Q&amp;A</a:t>
+            </a:r>
+            <a:endParaRPr lang="en-US" sz="2000" dirty="0"/>
           </a:p>
           <a:p>
             <a:pPr marL="0" indent="0">
@@ -4591,7 +4698,7 @@
           <a:p>
             <a:r>
               <a:rPr lang="en-US" sz="4800" dirty="0"/>
-              <a:t>PHP</a:t>
+              <a:t>Project 5</a:t>
             </a:r>
           </a:p>
         </p:txBody>
@@ -4628,24 +4735,18 @@
       </p:grpSpPr>
       <p:sp>
         <p:nvSpPr>
-          <p:cNvPr id="4" name="Title 1">
-            <a:extLst>
-              <a:ext uri="{FF2B5EF4-FFF2-40B4-BE49-F238E27FC236}">
-                <a16:creationId xmlns:a16="http://schemas.microsoft.com/office/drawing/2014/main" id="{527CE47F-3EF6-48CA-9239-E8B6E5C6B41A}"/>
-              </a:ext>
-            </a:extLst>
-          </p:cNvPr>
-          <p:cNvSpPr>
-            <a:spLocks noGrp="1"/>
-          </p:cNvSpPr>
-          <p:nvPr>
-            <p:ph type="title"/>
+          <p:cNvPr id="2" name="Title 1"/>
+          <p:cNvSpPr>
+            <a:spLocks noGrp="1"/>
+          </p:cNvSpPr>
+          <p:nvPr>
+            <p:ph type="ctrTitle"/>
           </p:nvPr>
         </p:nvSpPr>
         <p:spPr>
           <a:xfrm>
-            <a:off x="838200" y="365125"/>
-            <a:ext cx="10515600" cy="1325563"/>
+            <a:off x="1524000" y="1122362"/>
+            <a:ext cx="9144000" cy="2690881"/>
           </a:xfrm>
         </p:spPr>
         <p:txBody>
@@ -4655,76 +4756,8 @@
           <a:lstStyle/>
           <a:p>
             <a:r>
-              <a:rPr lang="en-US" sz="3600" dirty="0"/>
-              <a:t>Todays Assignment</a:t>
-            </a:r>
-          </a:p>
-        </p:txBody>
-      </p:sp>
-      <p:sp>
-        <p:nvSpPr>
-          <p:cNvPr id="5" name="Content Placeholder 2">
-            <a:extLst>
-              <a:ext uri="{FF2B5EF4-FFF2-40B4-BE49-F238E27FC236}">
-                <a16:creationId xmlns:a16="http://schemas.microsoft.com/office/drawing/2014/main" id="{E8F0EA9A-219C-40FD-AE36-784EE1B77D56}"/>
-              </a:ext>
-            </a:extLst>
-          </p:cNvPr>
-          <p:cNvSpPr>
-            <a:spLocks noGrp="1"/>
-          </p:cNvSpPr>
-          <p:nvPr>
-            <p:ph idx="1"/>
-          </p:nvPr>
-        </p:nvSpPr>
-        <p:spPr>
-          <a:xfrm>
-            <a:off x="838198" y="1525772"/>
-            <a:ext cx="10515601" cy="4651191"/>
-          </a:xfrm>
-        </p:spPr>
-        <p:txBody>
-          <a:bodyPr>
-            <a:normAutofit/>
-          </a:bodyPr>
-          <a:lstStyle/>
-          <a:p>
-            <a:pPr marL="0" indent="0">
-              <a:spcBef>
-                <a:spcPts val="4800"/>
-              </a:spcBef>
-              <a:buNone/>
-            </a:pPr>
-            <a:r>
-              <a:rPr lang="en-US" sz="2000" u="sng" dirty="0"/>
-              <a:t>Assignment (before next class):</a:t>
-            </a:r>
-            <a:endParaRPr lang="en-US" sz="2000" dirty="0"/>
-          </a:p>
-          <a:p>
-            <a:r>
-              <a:rPr lang="en-US" sz="2000" dirty="0"/>
-              <a:t>Project 4: Contact Manager (client) with PHP lookup due </a:t>
-            </a:r>
-            <a:r>
-              <a:rPr lang="en-US" sz="2000" u="sng" dirty="0"/>
-              <a:t>Today</a:t>
-            </a:r>
-            <a:r>
-              <a:rPr lang="en-US" sz="2000" dirty="0"/>
-              <a:t> by 11:59pm</a:t>
-            </a:r>
-          </a:p>
-          <a:p>
-            <a:r>
-              <a:rPr lang="en-US" sz="2000" dirty="0"/>
-              <a:t>Decide your project 5 direction and be prepared to discuss on Monday</a:t>
-            </a:r>
-          </a:p>
-          <a:p>
-            <a:r>
-              <a:rPr lang="en-US" sz="2000" dirty="0"/>
-              <a:t>Take a look at the Midterm Exam 2 Study Guide</a:t>
+              <a:rPr lang="en-US" sz="4800" dirty="0"/>
+              <a:t>PHP</a:t>
             </a:r>
           </a:p>
         </p:txBody>
@@ -4732,7 +4765,7 @@
     </p:spTree>
     <p:extLst>
       <p:ext uri="{BB962C8B-B14F-4D97-AF65-F5344CB8AC3E}">
-        <p14:creationId xmlns:p14="http://schemas.microsoft.com/office/powerpoint/2010/main" val="3819419734"/>
+        <p14:creationId xmlns:p14="http://schemas.microsoft.com/office/powerpoint/2010/main" val="244784078"/>
       </p:ext>
     </p:extLst>
   </p:cSld>
@@ -4761,6 +4794,139 @@
       </p:grpSpPr>
       <p:sp>
         <p:nvSpPr>
+          <p:cNvPr id="4" name="Title 1">
+            <a:extLst>
+              <a:ext uri="{FF2B5EF4-FFF2-40B4-BE49-F238E27FC236}">
+                <a16:creationId xmlns:a16="http://schemas.microsoft.com/office/drawing/2014/main" id="{527CE47F-3EF6-48CA-9239-E8B6E5C6B41A}"/>
+              </a:ext>
+            </a:extLst>
+          </p:cNvPr>
+          <p:cNvSpPr>
+            <a:spLocks noGrp="1"/>
+          </p:cNvSpPr>
+          <p:nvPr>
+            <p:ph type="title"/>
+          </p:nvPr>
+        </p:nvSpPr>
+        <p:spPr>
+          <a:xfrm>
+            <a:off x="838200" y="365125"/>
+            <a:ext cx="10515600" cy="1325563"/>
+          </a:xfrm>
+        </p:spPr>
+        <p:txBody>
+          <a:bodyPr>
+            <a:normAutofit/>
+          </a:bodyPr>
+          <a:lstStyle/>
+          <a:p>
+            <a:r>
+              <a:rPr lang="en-US" sz="3600" dirty="0"/>
+              <a:t>Todays Assignment</a:t>
+            </a:r>
+          </a:p>
+        </p:txBody>
+      </p:sp>
+      <p:sp>
+        <p:nvSpPr>
+          <p:cNvPr id="5" name="Content Placeholder 2">
+            <a:extLst>
+              <a:ext uri="{FF2B5EF4-FFF2-40B4-BE49-F238E27FC236}">
+                <a16:creationId xmlns:a16="http://schemas.microsoft.com/office/drawing/2014/main" id="{E8F0EA9A-219C-40FD-AE36-784EE1B77D56}"/>
+              </a:ext>
+            </a:extLst>
+          </p:cNvPr>
+          <p:cNvSpPr>
+            <a:spLocks noGrp="1"/>
+          </p:cNvSpPr>
+          <p:nvPr>
+            <p:ph idx="1"/>
+          </p:nvPr>
+        </p:nvSpPr>
+        <p:spPr>
+          <a:xfrm>
+            <a:off x="838198" y="1525772"/>
+            <a:ext cx="10515601" cy="4651191"/>
+          </a:xfrm>
+        </p:spPr>
+        <p:txBody>
+          <a:bodyPr>
+            <a:normAutofit/>
+          </a:bodyPr>
+          <a:lstStyle/>
+          <a:p>
+            <a:pPr marL="0" indent="0">
+              <a:spcBef>
+                <a:spcPts val="4800"/>
+              </a:spcBef>
+              <a:buNone/>
+            </a:pPr>
+            <a:r>
+              <a:rPr lang="en-US" sz="2000" u="sng" dirty="0"/>
+              <a:t>Assignment (before next class):</a:t>
+            </a:r>
+            <a:endParaRPr lang="en-US" sz="2000" dirty="0"/>
+          </a:p>
+          <a:p>
+            <a:r>
+              <a:rPr lang="en-US" sz="2000" dirty="0"/>
+              <a:t>Project 4: Contact Manager (client) with PHP lookup due </a:t>
+            </a:r>
+            <a:r>
+              <a:rPr lang="en-US" sz="2000" u="sng" dirty="0"/>
+              <a:t>Today</a:t>
+            </a:r>
+            <a:r>
+              <a:rPr lang="en-US" sz="2000" dirty="0"/>
+              <a:t> by 11:59pm</a:t>
+            </a:r>
+          </a:p>
+          <a:p>
+            <a:r>
+              <a:rPr lang="en-US" sz="2000" dirty="0"/>
+              <a:t>Decide your project 5 direction and be prepared to discuss on Monday</a:t>
+            </a:r>
+          </a:p>
+          <a:p>
+            <a:r>
+              <a:rPr lang="en-US" sz="2000" dirty="0"/>
+              <a:t>Take a look at the Midterm Exam 2 Study Guide</a:t>
+            </a:r>
+          </a:p>
+        </p:txBody>
+      </p:sp>
+    </p:spTree>
+    <p:extLst>
+      <p:ext uri="{BB962C8B-B14F-4D97-AF65-F5344CB8AC3E}">
+        <p14:creationId xmlns:p14="http://schemas.microsoft.com/office/powerpoint/2010/main" val="3819419734"/>
+      </p:ext>
+    </p:extLst>
+  </p:cSld>
+  <p:clrMapOvr>
+    <a:masterClrMapping/>
+  </p:clrMapOvr>
+</p:sld>
+</file>
+
+<file path=ppt/slides/slide6.xml><?xml version="1.0" encoding="utf-8"?>
+<p:sld xmlns:a="http://schemas.openxmlformats.org/drawingml/2006/main" xmlns:r="http://schemas.openxmlformats.org/officeDocument/2006/relationships" xmlns:p="http://schemas.openxmlformats.org/presentationml/2006/main">
+  <p:cSld>
+    <p:spTree>
+      <p:nvGrpSpPr>
+        <p:cNvPr id="1" name=""/>
+        <p:cNvGrpSpPr/>
+        <p:nvPr/>
+      </p:nvGrpSpPr>
+      <p:grpSpPr>
+        <a:xfrm>
+          <a:off x="0" y="0"/>
+          <a:ext cx="0" cy="0"/>
+          <a:chOff x="0" y="0"/>
+          <a:chExt cx="0" cy="0"/>
+        </a:xfrm>
+      </p:grpSpPr>
+      <p:sp>
+        <p:nvSpPr>
           <p:cNvPr id="2" name="Title 1"/>
           <p:cNvSpPr>
             <a:spLocks noGrp="1"/>
@@ -4824,7 +4990,7 @@
 </p:sld>
 </file>
 
-<file path=ppt/slides/slide6.xml><?xml version="1.0" encoding="utf-8"?>
+<file path=ppt/slides/slide7.xml><?xml version="1.0" encoding="utf-8"?>
 <p:sld xmlns:a="http://schemas.openxmlformats.org/drawingml/2006/main" xmlns:r="http://schemas.openxmlformats.org/officeDocument/2006/relationships" xmlns:p="http://schemas.openxmlformats.org/presentationml/2006/main">
   <p:cSld>
     <p:bg>

</xml_diff>